<commit_message>
Version de domingo a la noche'
</commit_message>
<xml_diff>
--- a/Sistema de Control de Versión Git.pptx
+++ b/Sistema de Control de Versión Git.pptx
@@ -5,7 +5,7 @@
     <p:sldMasterId id="2147483648" r:id="rId1"/>
   </p:sldMasterIdLst>
   <p:notesMasterIdLst>
-    <p:notesMasterId r:id="rId24"/>
+    <p:notesMasterId r:id="rId26"/>
   </p:notesMasterIdLst>
   <p:sldIdLst>
     <p:sldId id="256" r:id="rId2"/>
@@ -30,6 +30,8 @@
     <p:sldId id="275" r:id="rId21"/>
     <p:sldId id="276" r:id="rId22"/>
     <p:sldId id="277" r:id="rId23"/>
+    <p:sldId id="278" r:id="rId24"/>
+    <p:sldId id="279" r:id="rId25"/>
   </p:sldIdLst>
   <p:sldSz cx="9144000" cy="6858000" type="screen4x3"/>
   <p:notesSz cx="6858000" cy="9144000"/>
@@ -6502,7 +6504,7 @@
           <a:p>
             <a:pPr algn="ctr"/>
             <a:r>
-              <a:rPr lang="es-AR" sz="4000" u="sng" dirty="0" err="1">
+              <a:rPr lang="es-AR" sz="4000" u="sng" dirty="0">
                 <a:solidFill>
                   <a:schemeClr val="tx1">
                     <a:lumMod val="65000"/>
@@ -6515,17 +6517,6 @@
               </a:rPr>
               <a:t>Issues</a:t>
             </a:r>
-            <a:endParaRPr lang="es-AR" sz="4000" u="sng" dirty="0">
-              <a:solidFill>
-                <a:schemeClr val="tx1">
-                  <a:lumMod val="65000"/>
-                  <a:lumOff val="35000"/>
-                </a:schemeClr>
-              </a:solidFill>
-              <a:latin typeface="+mj-lt"/>
-              <a:ea typeface="+mj-ea"/>
-              <a:cs typeface="+mj-cs"/>
-            </a:endParaRPr>
           </a:p>
           <a:p>
             <a:endParaRPr lang="es-AR" sz="2800" dirty="0" smtClean="0">
@@ -6646,47 +6637,7 @@
                   </a:schemeClr>
                 </a:solidFill>
               </a:rPr>
-              <a:t>En esta página se pueden crear y modificar </a:t>
-            </a:r>
-            <a:r>
-              <a:rPr lang="es-AR" sz="2800" dirty="0" err="1">
-                <a:solidFill>
-                  <a:schemeClr val="tx1">
-                    <a:tint val="75000"/>
-                  </a:schemeClr>
-                </a:solidFill>
-              </a:rPr>
-              <a:t>issues</a:t>
-            </a:r>
-            <a:r>
-              <a:rPr lang="es-AR" sz="2800" dirty="0">
-                <a:solidFill>
-                  <a:schemeClr val="tx1">
-                    <a:tint val="75000"/>
-                  </a:schemeClr>
-                </a:solidFill>
-              </a:rPr>
-              <a:t>. Dentro de un </a:t>
-            </a:r>
-            <a:r>
-              <a:rPr lang="es-AR" sz="2800" dirty="0" err="1">
-                <a:solidFill>
-                  <a:schemeClr val="tx1">
-                    <a:tint val="75000"/>
-                  </a:schemeClr>
-                </a:solidFill>
-              </a:rPr>
-              <a:t>issues</a:t>
-            </a:r>
-            <a:r>
-              <a:rPr lang="es-AR" sz="2800" dirty="0">
-                <a:solidFill>
-                  <a:schemeClr val="tx1">
-                    <a:tint val="75000"/>
-                  </a:schemeClr>
-                </a:solidFill>
-              </a:rPr>
-              <a:t> se puede establecer un diálogo entre los integrantes del proyecto</a:t>
+              <a:t>En esta página se pueden crear y modificar issues. Dentro de un issues se puede establecer un diálogo entre los integrantes del proyecto</a:t>
             </a:r>
             <a:r>
               <a:rPr lang="es-AR" dirty="0" smtClean="0"/>
@@ -6803,6 +6754,58 @@
           </a:extLst>
         </p:spPr>
       </p:pic>
+      <p:sp>
+        <p:nvSpPr>
+          <p:cNvPr id="3" name="2 CuadroTexto"/>
+          <p:cNvSpPr txBox="1"/>
+          <p:nvPr/>
+        </p:nvSpPr>
+        <p:spPr>
+          <a:xfrm>
+            <a:off x="719572" y="5586566"/>
+            <a:ext cx="7776864" cy="523220"/>
+          </a:xfrm>
+          <a:prstGeom prst="rect">
+            <a:avLst/>
+          </a:prstGeom>
+          <a:noFill/>
+        </p:spPr>
+        <p:txBody>
+          <a:bodyPr wrap="square" rtlCol="0">
+            <a:spAutoFit/>
+          </a:bodyPr>
+          <a:lstStyle/>
+          <a:p>
+            <a:r>
+              <a:rPr lang="es-AR" sz="2800" dirty="0">
+                <a:solidFill>
+                  <a:schemeClr val="tx1">
+                    <a:tint val="75000"/>
+                  </a:schemeClr>
+                </a:solidFill>
+              </a:rPr>
+              <a:t>Cuando se termina la tarea hay que cerrar el </a:t>
+            </a:r>
+            <a:r>
+              <a:rPr lang="es-AR" sz="2800" dirty="0" smtClean="0">
+                <a:solidFill>
+                  <a:schemeClr val="tx1">
+                    <a:tint val="75000"/>
+                  </a:schemeClr>
+                </a:solidFill>
+              </a:rPr>
+              <a:t>issues.</a:t>
+            </a:r>
+            <a:endParaRPr lang="es-AR" sz="2800" dirty="0">
+              <a:solidFill>
+                <a:schemeClr val="tx1">
+                  <a:tint val="75000"/>
+                </a:schemeClr>
+              </a:solidFill>
+            </a:endParaRPr>
+          </a:p>
+        </p:txBody>
+      </p:sp>
     </p:spTree>
     <p:extLst>
       <p:ext uri="{BB962C8B-B14F-4D97-AF65-F5344CB8AC3E}">
@@ -6856,10 +6859,516 @@
           </a:p>
         </p:txBody>
       </p:sp>
+      <p:sp>
+        <p:nvSpPr>
+          <p:cNvPr id="4" name="3 CuadroTexto"/>
+          <p:cNvSpPr txBox="1"/>
+          <p:nvPr/>
+        </p:nvSpPr>
+        <p:spPr>
+          <a:xfrm>
+            <a:off x="107504" y="282714"/>
+            <a:ext cx="9036496" cy="1138773"/>
+          </a:xfrm>
+          <a:prstGeom prst="rect">
+            <a:avLst/>
+          </a:prstGeom>
+          <a:noFill/>
+        </p:spPr>
+        <p:txBody>
+          <a:bodyPr wrap="square" rtlCol="0">
+            <a:spAutoFit/>
+          </a:bodyPr>
+          <a:lstStyle/>
+          <a:p>
+            <a:pPr algn="ctr"/>
+            <a:r>
+              <a:rPr lang="es-AR" sz="4000" u="sng" dirty="0" smtClean="0">
+                <a:solidFill>
+                  <a:schemeClr val="tx1">
+                    <a:lumMod val="65000"/>
+                    <a:lumOff val="35000"/>
+                  </a:schemeClr>
+                </a:solidFill>
+                <a:latin typeface="+mj-lt"/>
+                <a:ea typeface="+mj-ea"/>
+                <a:cs typeface="+mj-cs"/>
+              </a:rPr>
+              <a:t>Milestones</a:t>
+            </a:r>
+          </a:p>
+          <a:p>
+            <a:r>
+              <a:rPr lang="es-AR" sz="2800" dirty="0">
+                <a:solidFill>
+                  <a:schemeClr val="tx1">
+                    <a:tint val="75000"/>
+                  </a:schemeClr>
+                </a:solidFill>
+              </a:rPr>
+              <a:t>Es un conjuntos de issues que tienen un plazo de finalización.</a:t>
+            </a:r>
+            <a:endParaRPr lang="es-AR" sz="2800" dirty="0">
+              <a:solidFill>
+                <a:schemeClr val="tx1">
+                  <a:tint val="75000"/>
+                </a:schemeClr>
+              </a:solidFill>
+            </a:endParaRPr>
+          </a:p>
+        </p:txBody>
+      </p:sp>
+      <p:pic>
+        <p:nvPicPr>
+          <p:cNvPr id="3074" name="Picture 2"/>
+          <p:cNvPicPr>
+            <a:picLocks noChangeAspect="1" noChangeArrowheads="1"/>
+          </p:cNvPicPr>
+          <p:nvPr/>
+        </p:nvPicPr>
+        <p:blipFill>
+          <a:blip r:embed="rId2">
+            <a:extLst>
+              <a:ext uri="{28A0092B-C50C-407E-A947-70E740481C1C}">
+                <a14:useLocalDpi xmlns:a14="http://schemas.microsoft.com/office/drawing/2010/main" val="0"/>
+              </a:ext>
+            </a:extLst>
+          </a:blip>
+          <a:srcRect/>
+          <a:stretch>
+            <a:fillRect/>
+          </a:stretch>
+        </p:blipFill>
+        <p:spPr bwMode="auto">
+          <a:xfrm>
+            <a:off x="1115616" y="1421487"/>
+            <a:ext cx="6588224" cy="3672632"/>
+          </a:xfrm>
+          <a:prstGeom prst="rect">
+            <a:avLst/>
+          </a:prstGeom>
+          <a:noFill/>
+          <a:ln>
+            <a:noFill/>
+          </a:ln>
+          <a:extLst>
+            <a:ext uri="{909E8E84-426E-40DD-AFC4-6F175D3DCCD1}">
+              <a14:hiddenFill xmlns:a14="http://schemas.microsoft.com/office/drawing/2010/main">
+                <a:solidFill>
+                  <a:schemeClr val="accent1"/>
+                </a:solidFill>
+              </a14:hiddenFill>
+            </a:ext>
+            <a:ext uri="{91240B29-F687-4F45-9708-019B960494DF}">
+              <a14:hiddenLine xmlns:a14="http://schemas.microsoft.com/office/drawing/2010/main" w="9525">
+                <a:solidFill>
+                  <a:schemeClr val="tx1"/>
+                </a:solidFill>
+                <a:miter lim="800000"/>
+                <a:headEnd/>
+                <a:tailEnd/>
+              </a14:hiddenLine>
+            </a:ext>
+          </a:extLst>
+        </p:spPr>
+      </p:pic>
+      <p:sp>
+        <p:nvSpPr>
+          <p:cNvPr id="5" name="4 CuadroTexto"/>
+          <p:cNvSpPr txBox="1"/>
+          <p:nvPr/>
+        </p:nvSpPr>
+        <p:spPr>
+          <a:xfrm>
+            <a:off x="264840" y="5373216"/>
+            <a:ext cx="8699648" cy="800219"/>
+          </a:xfrm>
+          <a:prstGeom prst="rect">
+            <a:avLst/>
+          </a:prstGeom>
+          <a:noFill/>
+        </p:spPr>
+        <p:txBody>
+          <a:bodyPr wrap="square" rtlCol="0">
+            <a:spAutoFit/>
+          </a:bodyPr>
+          <a:lstStyle/>
+          <a:p>
+            <a:r>
+              <a:rPr lang="es-AR" sz="2800" dirty="0">
+                <a:solidFill>
+                  <a:schemeClr val="tx1">
+                    <a:tint val="75000"/>
+                  </a:schemeClr>
+                </a:solidFill>
+              </a:rPr>
+              <a:t>Luego hay que asignar los issues que lo van a conformar</a:t>
+            </a:r>
+            <a:r>
+              <a:rPr lang="es-AR" dirty="0" smtClean="0"/>
+              <a:t>.</a:t>
+            </a:r>
+          </a:p>
+          <a:p>
+            <a:endParaRPr lang="es-AR" dirty="0"/>
+          </a:p>
+        </p:txBody>
+      </p:sp>
     </p:spTree>
     <p:extLst>
       <p:ext uri="{BB962C8B-B14F-4D97-AF65-F5344CB8AC3E}">
         <p14:creationId xmlns:p14="http://schemas.microsoft.com/office/powerpoint/2010/main" val="2273123575"/>
+      </p:ext>
+    </p:extLst>
+  </p:cSld>
+  <p:clrMapOvr>
+    <a:masterClrMapping/>
+  </p:clrMapOvr>
+</p:sld>
+</file>
+
+<file path=ppt/slides/slide23.xml><?xml version="1.0" encoding="utf-8"?>
+<p:sld xmlns:a="http://schemas.openxmlformats.org/drawingml/2006/main" xmlns:r="http://schemas.openxmlformats.org/officeDocument/2006/relationships" xmlns:p="http://schemas.openxmlformats.org/presentationml/2006/main">
+  <p:cSld>
+    <p:spTree>
+      <p:nvGrpSpPr>
+        <p:cNvPr id="1" name=""/>
+        <p:cNvGrpSpPr/>
+        <p:nvPr/>
+      </p:nvGrpSpPr>
+      <p:grpSpPr>
+        <a:xfrm>
+          <a:off x="0" y="0"/>
+          <a:ext cx="0" cy="0"/>
+          <a:chOff x="0" y="0"/>
+          <a:chExt cx="0" cy="0"/>
+        </a:xfrm>
+      </p:grpSpPr>
+      <p:sp>
+        <p:nvSpPr>
+          <p:cNvPr id="2" name="1 Marcador de número de diapositiva"/>
+          <p:cNvSpPr>
+            <a:spLocks noGrp="1"/>
+          </p:cNvSpPr>
+          <p:nvPr>
+            <p:ph type="sldNum" sz="quarter" idx="12"/>
+          </p:nvPr>
+        </p:nvSpPr>
+        <p:spPr/>
+        <p:txBody>
+          <a:bodyPr/>
+          <a:lstStyle/>
+          <a:p>
+            <a:fld id="{0BC4794F-2822-4E64-BD4E-610CFED61AD4}" type="slidenum">
+              <a:rPr lang="es-AR" smtClean="0"/>
+              <a:t>23</a:t>
+            </a:fld>
+            <a:endParaRPr lang="es-AR"/>
+          </a:p>
+        </p:txBody>
+      </p:sp>
+      <p:pic>
+        <p:nvPicPr>
+          <p:cNvPr id="4098" name="Picture 2"/>
+          <p:cNvPicPr>
+            <a:picLocks noChangeAspect="1" noChangeArrowheads="1"/>
+          </p:cNvPicPr>
+          <p:nvPr/>
+        </p:nvPicPr>
+        <p:blipFill>
+          <a:blip r:embed="rId2">
+            <a:extLst>
+              <a:ext uri="{28A0092B-C50C-407E-A947-70E740481C1C}">
+                <a14:useLocalDpi xmlns:a14="http://schemas.microsoft.com/office/drawing/2010/main" val="0"/>
+              </a:ext>
+            </a:extLst>
+          </a:blip>
+          <a:srcRect/>
+          <a:stretch>
+            <a:fillRect/>
+          </a:stretch>
+        </p:blipFill>
+        <p:spPr bwMode="auto">
+          <a:xfrm>
+            <a:off x="2123728" y="2276872"/>
+            <a:ext cx="4286250" cy="2924175"/>
+          </a:xfrm>
+          <a:prstGeom prst="rect">
+            <a:avLst/>
+          </a:prstGeom>
+          <a:noFill/>
+          <a:ln>
+            <a:noFill/>
+          </a:ln>
+          <a:extLst>
+            <a:ext uri="{909E8E84-426E-40DD-AFC4-6F175D3DCCD1}">
+              <a14:hiddenFill xmlns:a14="http://schemas.microsoft.com/office/drawing/2010/main">
+                <a:solidFill>
+                  <a:schemeClr val="accent1"/>
+                </a:solidFill>
+              </a14:hiddenFill>
+            </a:ext>
+            <a:ext uri="{91240B29-F687-4F45-9708-019B960494DF}">
+              <a14:hiddenLine xmlns:a14="http://schemas.microsoft.com/office/drawing/2010/main" w="9525">
+                <a:solidFill>
+                  <a:schemeClr val="tx1"/>
+                </a:solidFill>
+                <a:miter lim="800000"/>
+                <a:headEnd/>
+                <a:tailEnd/>
+              </a14:hiddenLine>
+            </a:ext>
+          </a:extLst>
+        </p:spPr>
+      </p:pic>
+      <p:sp>
+        <p:nvSpPr>
+          <p:cNvPr id="3" name="2 CuadroTexto"/>
+          <p:cNvSpPr txBox="1"/>
+          <p:nvPr/>
+        </p:nvSpPr>
+        <p:spPr>
+          <a:xfrm>
+            <a:off x="395536" y="633414"/>
+            <a:ext cx="8352928" cy="1384995"/>
+          </a:xfrm>
+          <a:prstGeom prst="rect">
+            <a:avLst/>
+          </a:prstGeom>
+          <a:noFill/>
+        </p:spPr>
+        <p:txBody>
+          <a:bodyPr wrap="square" rtlCol="0">
+            <a:spAutoFit/>
+          </a:bodyPr>
+          <a:lstStyle/>
+          <a:p>
+            <a:r>
+              <a:rPr lang="es-AR" sz="2800" dirty="0">
+                <a:solidFill>
+                  <a:schemeClr val="tx1">
+                    <a:tint val="75000"/>
+                  </a:schemeClr>
+                </a:solidFill>
+              </a:rPr>
+              <a:t>En el panel derecho de la ventana para crear issues hay una estrellita que al seleccionarla permite asociar a el issues a un milestone.</a:t>
+            </a:r>
+            <a:endParaRPr lang="es-AR" sz="2800" dirty="0">
+              <a:solidFill>
+                <a:schemeClr val="tx1">
+                  <a:tint val="75000"/>
+                </a:schemeClr>
+              </a:solidFill>
+            </a:endParaRPr>
+          </a:p>
+        </p:txBody>
+      </p:sp>
+      <p:sp>
+        <p:nvSpPr>
+          <p:cNvPr id="4" name="3 CuadroTexto"/>
+          <p:cNvSpPr txBox="1"/>
+          <p:nvPr/>
+        </p:nvSpPr>
+        <p:spPr>
+          <a:xfrm>
+            <a:off x="395536" y="5517232"/>
+            <a:ext cx="8352928" cy="954107"/>
+          </a:xfrm>
+          <a:prstGeom prst="rect">
+            <a:avLst/>
+          </a:prstGeom>
+          <a:noFill/>
+        </p:spPr>
+        <p:txBody>
+          <a:bodyPr wrap="square" rtlCol="0">
+            <a:spAutoFit/>
+          </a:bodyPr>
+          <a:lstStyle/>
+          <a:p>
+            <a:r>
+              <a:rPr lang="es-AR" sz="2800" dirty="0">
+                <a:solidFill>
+                  <a:schemeClr val="tx1">
+                    <a:tint val="75000"/>
+                  </a:schemeClr>
+                </a:solidFill>
+              </a:rPr>
+              <a:t>El milestone concluye cuando se cierran todos los issues que lo conforman.</a:t>
+            </a:r>
+            <a:endParaRPr lang="es-AR" sz="2800" dirty="0">
+              <a:solidFill>
+                <a:schemeClr val="tx1">
+                  <a:tint val="75000"/>
+                </a:schemeClr>
+              </a:solidFill>
+            </a:endParaRPr>
+          </a:p>
+        </p:txBody>
+      </p:sp>
+    </p:spTree>
+    <p:extLst>
+      <p:ext uri="{BB962C8B-B14F-4D97-AF65-F5344CB8AC3E}">
+        <p14:creationId xmlns:p14="http://schemas.microsoft.com/office/powerpoint/2010/main" val="79989148"/>
+      </p:ext>
+    </p:extLst>
+  </p:cSld>
+  <p:clrMapOvr>
+    <a:masterClrMapping/>
+  </p:clrMapOvr>
+</p:sld>
+</file>
+
+<file path=ppt/slides/slide24.xml><?xml version="1.0" encoding="utf-8"?>
+<p:sld xmlns:a="http://schemas.openxmlformats.org/drawingml/2006/main" xmlns:r="http://schemas.openxmlformats.org/officeDocument/2006/relationships" xmlns:p="http://schemas.openxmlformats.org/presentationml/2006/main">
+  <p:cSld>
+    <p:spTree>
+      <p:nvGrpSpPr>
+        <p:cNvPr id="1" name=""/>
+        <p:cNvGrpSpPr/>
+        <p:nvPr/>
+      </p:nvGrpSpPr>
+      <p:grpSpPr>
+        <a:xfrm>
+          <a:off x="0" y="0"/>
+          <a:ext cx="0" cy="0"/>
+          <a:chOff x="0" y="0"/>
+          <a:chExt cx="0" cy="0"/>
+        </a:xfrm>
+      </p:grpSpPr>
+      <p:sp>
+        <p:nvSpPr>
+          <p:cNvPr id="2" name="1 Marcador de número de diapositiva"/>
+          <p:cNvSpPr>
+            <a:spLocks noGrp="1"/>
+          </p:cNvSpPr>
+          <p:nvPr>
+            <p:ph type="sldNum" sz="quarter" idx="12"/>
+          </p:nvPr>
+        </p:nvSpPr>
+        <p:spPr/>
+        <p:txBody>
+          <a:bodyPr/>
+          <a:lstStyle/>
+          <a:p>
+            <a:fld id="{0BC4794F-2822-4E64-BD4E-610CFED61AD4}" type="slidenum">
+              <a:rPr lang="es-AR" smtClean="0"/>
+              <a:t>24</a:t>
+            </a:fld>
+            <a:endParaRPr lang="es-AR"/>
+          </a:p>
+        </p:txBody>
+      </p:sp>
+      <p:sp>
+        <p:nvSpPr>
+          <p:cNvPr id="3" name="2 CuadroTexto"/>
+          <p:cNvSpPr txBox="1"/>
+          <p:nvPr/>
+        </p:nvSpPr>
+        <p:spPr>
+          <a:xfrm>
+            <a:off x="0" y="188640"/>
+            <a:ext cx="9144000" cy="3123932"/>
+          </a:xfrm>
+          <a:prstGeom prst="rect">
+            <a:avLst/>
+          </a:prstGeom>
+          <a:noFill/>
+        </p:spPr>
+        <p:txBody>
+          <a:bodyPr wrap="square" rtlCol="0">
+            <a:spAutoFit/>
+          </a:bodyPr>
+          <a:lstStyle/>
+          <a:p>
+            <a:pPr algn="ctr"/>
+            <a:r>
+              <a:rPr lang="es-AR" sz="4000" u="sng" dirty="0">
+                <a:solidFill>
+                  <a:schemeClr val="tx1">
+                    <a:lumMod val="65000"/>
+                    <a:lumOff val="35000"/>
+                  </a:schemeClr>
+                </a:solidFill>
+                <a:latin typeface="+mj-lt"/>
+                <a:ea typeface="+mj-ea"/>
+                <a:cs typeface="+mj-cs"/>
+              </a:rPr>
+              <a:t>Labels</a:t>
+            </a:r>
+          </a:p>
+          <a:p>
+            <a:endParaRPr lang="es-AR" dirty="0" smtClean="0"/>
+          </a:p>
+          <a:p>
+            <a:r>
+              <a:rPr lang="es-AR" sz="2700" dirty="0">
+                <a:solidFill>
+                  <a:schemeClr val="tx1">
+                    <a:tint val="75000"/>
+                  </a:schemeClr>
+                </a:solidFill>
+              </a:rPr>
+              <a:t>Son etiquetas que sirven para identificar que tipo de problema es un issues</a:t>
+            </a:r>
+            <a:r>
+              <a:rPr lang="es-AR" sz="2800" dirty="0">
+                <a:solidFill>
+                  <a:schemeClr val="tx1">
+                    <a:tint val="75000"/>
+                  </a:schemeClr>
+                </a:solidFill>
+              </a:rPr>
+              <a:t>. </a:t>
+            </a:r>
+            <a:r>
+              <a:rPr lang="es-AR" sz="2800" dirty="0" smtClean="0">
+                <a:solidFill>
+                  <a:schemeClr val="tx1">
+                    <a:tint val="75000"/>
+                  </a:schemeClr>
+                </a:solidFill>
+              </a:rPr>
+              <a:t>Viene una serie de etiquetas por defecto, se pueden borrar, modificar o crear nuevas. </a:t>
+            </a:r>
+          </a:p>
+          <a:p>
+            <a:r>
+              <a:rPr lang="es-AR" sz="2800" dirty="0" smtClean="0">
+                <a:solidFill>
+                  <a:schemeClr val="tx1">
+                    <a:tint val="75000"/>
+                  </a:schemeClr>
+                </a:solidFill>
+              </a:rPr>
+              <a:t>Las etiquetas se encuentran en el mismo panel que los </a:t>
+            </a:r>
+            <a:r>
+              <a:rPr lang="es-AR" sz="2800" dirty="0" err="1" smtClean="0">
+                <a:solidFill>
+                  <a:schemeClr val="tx1">
+                    <a:tint val="75000"/>
+                  </a:schemeClr>
+                </a:solidFill>
+              </a:rPr>
+              <a:t>milestones</a:t>
+            </a:r>
+            <a:r>
+              <a:rPr lang="es-AR" sz="2800" dirty="0" smtClean="0">
+                <a:solidFill>
+                  <a:schemeClr val="tx1">
+                    <a:tint val="75000"/>
+                  </a:schemeClr>
+                </a:solidFill>
+              </a:rPr>
+              <a:t>.</a:t>
+            </a:r>
+          </a:p>
+        </p:txBody>
+      </p:sp>
+    </p:spTree>
+    <p:extLst>
+      <p:ext uri="{BB962C8B-B14F-4D97-AF65-F5344CB8AC3E}">
+        <p14:creationId xmlns:p14="http://schemas.microsoft.com/office/powerpoint/2010/main" val="3247527675"/>
       </p:ext>
     </p:extLst>
   </p:cSld>

</xml_diff>

<commit_message>
Version Martes a la Noche
</commit_message>
<xml_diff>
--- a/Sistema de Control de Versión Git.pptx
+++ b/Sistema de Control de Versión Git.pptx
@@ -5,7 +5,7 @@
     <p:sldMasterId id="2147483648" r:id="rId1"/>
   </p:sldMasterIdLst>
   <p:notesMasterIdLst>
-    <p:notesMasterId r:id="rId27"/>
+    <p:notesMasterId r:id="rId30"/>
   </p:notesMasterIdLst>
   <p:sldIdLst>
     <p:sldId id="256" r:id="rId2"/>
@@ -33,6 +33,9 @@
     <p:sldId id="278" r:id="rId24"/>
     <p:sldId id="279" r:id="rId25"/>
     <p:sldId id="280" r:id="rId26"/>
+    <p:sldId id="281" r:id="rId27"/>
+    <p:sldId id="282" r:id="rId28"/>
+    <p:sldId id="283" r:id="rId29"/>
   </p:sldIdLst>
   <p:sldSz cx="9144000" cy="6858000" type="screen4x3"/>
   <p:notesSz cx="6858000" cy="9144000"/>
@@ -133,7 +136,7 @@
   </p:defaultTextStyle>
   <p:extLst>
     <p:ext uri="{EFAFB233-063F-42B5-8137-9DF3F51BA10A}">
-      <p15:sldGuideLst xmlns:p15="http://schemas.microsoft.com/office/powerpoint/2012/main">
+      <p15:sldGuideLst xmlns:p15="http://schemas.microsoft.com/office/powerpoint/2012/main" xmlns="">
         <p15:guide id="1" orient="horz" pos="2160">
           <p15:clr>
             <a:srgbClr val="A4A3A4"/>
@@ -232,7 +235,7 @@
           <a:p>
             <a:fld id="{0D17CBF0-7B9B-444A-9283-00D0460BF30A}" type="datetimeFigureOut">
               <a:rPr lang="es-AR" smtClean="0"/>
-              <a:t>27/8/2018</a:t>
+              <a:t>28/8/2018</a:t>
             </a:fld>
             <a:endParaRPr lang="es-AR"/>
           </a:p>
@@ -765,7 +768,7 @@
           <a:p>
             <a:fld id="{FC055828-25D0-4C5B-9570-ECD8F8667A1F}" type="datetime1">
               <a:rPr lang="es-AR" smtClean="0"/>
-              <a:t>27/8/2018</a:t>
+              <a:t>28/8/2018</a:t>
             </a:fld>
             <a:endParaRPr lang="es-AR"/>
           </a:p>
@@ -935,7 +938,7 @@
           <a:p>
             <a:fld id="{CCE0CE49-43A0-4E7B-B853-2F72F183CA79}" type="datetime1">
               <a:rPr lang="es-AR" smtClean="0"/>
-              <a:t>27/8/2018</a:t>
+              <a:t>28/8/2018</a:t>
             </a:fld>
             <a:endParaRPr lang="es-AR"/>
           </a:p>
@@ -1115,7 +1118,7 @@
           <a:p>
             <a:fld id="{91379723-A450-4B4E-9670-588C05DAAA20}" type="datetime1">
               <a:rPr lang="es-AR" smtClean="0"/>
-              <a:t>27/8/2018</a:t>
+              <a:t>28/8/2018</a:t>
             </a:fld>
             <a:endParaRPr lang="es-AR"/>
           </a:p>
@@ -1285,7 +1288,7 @@
           <a:p>
             <a:fld id="{9BFD5835-CE55-475D-A518-9F72173CE528}" type="datetime1">
               <a:rPr lang="es-AR" smtClean="0"/>
-              <a:t>27/8/2018</a:t>
+              <a:t>28/8/2018</a:t>
             </a:fld>
             <a:endParaRPr lang="es-AR"/>
           </a:p>
@@ -1531,7 +1534,7 @@
           <a:p>
             <a:fld id="{C15F9449-7091-4E25-8C34-0E1377999D55}" type="datetime1">
               <a:rPr lang="es-AR" smtClean="0"/>
-              <a:t>27/8/2018</a:t>
+              <a:t>28/8/2018</a:t>
             </a:fld>
             <a:endParaRPr lang="es-AR"/>
           </a:p>
@@ -1819,7 +1822,7 @@
           <a:p>
             <a:fld id="{248207F6-5C03-47FB-8492-3CBE7878C838}" type="datetime1">
               <a:rPr lang="es-AR" smtClean="0"/>
-              <a:t>27/8/2018</a:t>
+              <a:t>28/8/2018</a:t>
             </a:fld>
             <a:endParaRPr lang="es-AR"/>
           </a:p>
@@ -2241,7 +2244,7 @@
           <a:p>
             <a:fld id="{4E997F51-3F98-4905-AF10-CBD7A3333C2D}" type="datetime1">
               <a:rPr lang="es-AR" smtClean="0"/>
-              <a:t>27/8/2018</a:t>
+              <a:t>28/8/2018</a:t>
             </a:fld>
             <a:endParaRPr lang="es-AR"/>
           </a:p>
@@ -2359,7 +2362,7 @@
           <a:p>
             <a:fld id="{001DE167-2DF3-4B76-B391-7374E34B46C1}" type="datetime1">
               <a:rPr lang="es-AR" smtClean="0"/>
-              <a:t>27/8/2018</a:t>
+              <a:t>28/8/2018</a:t>
             </a:fld>
             <a:endParaRPr lang="es-AR"/>
           </a:p>
@@ -2454,7 +2457,7 @@
           <a:p>
             <a:fld id="{1254A379-9457-4AED-8991-3A544BE89B5B}" type="datetime1">
               <a:rPr lang="es-AR" smtClean="0"/>
-              <a:t>27/8/2018</a:t>
+              <a:t>28/8/2018</a:t>
             </a:fld>
             <a:endParaRPr lang="es-AR"/>
           </a:p>
@@ -2731,7 +2734,7 @@
           <a:p>
             <a:fld id="{1223DE9A-CCD9-4D77-B6F6-C778FF584403}" type="datetime1">
               <a:rPr lang="es-AR" smtClean="0"/>
-              <a:t>27/8/2018</a:t>
+              <a:t>28/8/2018</a:t>
             </a:fld>
             <a:endParaRPr lang="es-AR"/>
           </a:p>
@@ -2984,7 +2987,7 @@
           <a:p>
             <a:fld id="{FA2A4C84-9CD8-45F4-9698-1EBEFF079657}" type="datetime1">
               <a:rPr lang="es-AR" smtClean="0"/>
-              <a:t>27/8/2018</a:t>
+              <a:t>28/8/2018</a:t>
             </a:fld>
             <a:endParaRPr lang="es-AR"/>
           </a:p>
@@ -3197,7 +3200,7 @@
           <a:p>
             <a:fld id="{FE0F7B58-7218-4E57-85B0-D14C51F8DC58}" type="datetime1">
               <a:rPr lang="es-AR" smtClean="0"/>
-              <a:t>27/8/2018</a:t>
+              <a:t>28/8/2018</a:t>
             </a:fld>
             <a:endParaRPr lang="es-AR"/>
           </a:p>
@@ -4043,7 +4046,7 @@
           <p:cNvPr id="5" name="Picture 2">
             <a:extLst>
               <a:ext uri="{FF2B5EF4-FFF2-40B4-BE49-F238E27FC236}">
-                <a16:creationId xmlns:a16="http://schemas.microsoft.com/office/drawing/2014/main" id="{E4BD8CAE-0A46-4AE5-9FAD-BF6B94B41393}"/>
+                <a16:creationId xmlns:a16="http://schemas.microsoft.com/office/drawing/2014/main" xmlns="" id="{E4BD8CAE-0A46-4AE5-9FAD-BF6B94B41393}"/>
               </a:ext>
             </a:extLst>
           </p:cNvPr>
@@ -4133,7 +4136,7 @@
           <p:cNvPr id="3" name="Marcador de contenido 2">
             <a:extLst>
               <a:ext uri="{FF2B5EF4-FFF2-40B4-BE49-F238E27FC236}">
-                <a16:creationId xmlns:a16="http://schemas.microsoft.com/office/drawing/2014/main" id="{DECE3A43-D077-492D-95E7-89B677FD3BD8}"/>
+                <a16:creationId xmlns:a16="http://schemas.microsoft.com/office/drawing/2014/main" xmlns="" id="{DECE3A43-D077-492D-95E7-89B677FD3BD8}"/>
               </a:ext>
             </a:extLst>
           </p:cNvPr>
@@ -4385,7 +4388,7 @@
           <p:cNvPr id="4" name="Marcador de número de diapositiva 3">
             <a:extLst>
               <a:ext uri="{FF2B5EF4-FFF2-40B4-BE49-F238E27FC236}">
-                <a16:creationId xmlns:a16="http://schemas.microsoft.com/office/drawing/2014/main" id="{02329391-F7C3-40D7-A47F-2A01C2952E87}"/>
+                <a16:creationId xmlns:a16="http://schemas.microsoft.com/office/drawing/2014/main" xmlns="" id="{02329391-F7C3-40D7-A47F-2A01C2952E87}"/>
               </a:ext>
             </a:extLst>
           </p:cNvPr>
@@ -4414,7 +4417,7 @@
           <p:cNvPr id="5" name="Picture 2">
             <a:extLst>
               <a:ext uri="{FF2B5EF4-FFF2-40B4-BE49-F238E27FC236}">
-                <a16:creationId xmlns:a16="http://schemas.microsoft.com/office/drawing/2014/main" id="{67F55F4E-8983-47FF-BB0E-AD465B7196AD}"/>
+                <a16:creationId xmlns:a16="http://schemas.microsoft.com/office/drawing/2014/main" xmlns="" id="{67F55F4E-8983-47FF-BB0E-AD465B7196AD}"/>
               </a:ext>
             </a:extLst>
           </p:cNvPr>
@@ -4504,7 +4507,7 @@
           <p:cNvPr id="2" name="Marcador de número de diapositiva 1">
             <a:extLst>
               <a:ext uri="{FF2B5EF4-FFF2-40B4-BE49-F238E27FC236}">
-                <a16:creationId xmlns:a16="http://schemas.microsoft.com/office/drawing/2014/main" id="{DA3701C4-F7D6-42EE-820C-F134688B8FCB}"/>
+                <a16:creationId xmlns:a16="http://schemas.microsoft.com/office/drawing/2014/main" xmlns="" id="{DA3701C4-F7D6-42EE-820C-F134688B8FCB}"/>
               </a:ext>
             </a:extLst>
           </p:cNvPr>
@@ -4533,7 +4536,7 @@
           <p:cNvPr id="3" name="Imagen 2">
             <a:extLst>
               <a:ext uri="{FF2B5EF4-FFF2-40B4-BE49-F238E27FC236}">
-                <a16:creationId xmlns:a16="http://schemas.microsoft.com/office/drawing/2014/main" id="{60AB278C-6FF6-4D11-BCA6-9F0B353A0630}"/>
+                <a16:creationId xmlns:a16="http://schemas.microsoft.com/office/drawing/2014/main" xmlns="" id="{60AB278C-6FF6-4D11-BCA6-9F0B353A0630}"/>
               </a:ext>
             </a:extLst>
           </p:cNvPr>
@@ -4563,7 +4566,7 @@
           <p:cNvPr id="4" name="Rectángulo 3">
             <a:extLst>
               <a:ext uri="{FF2B5EF4-FFF2-40B4-BE49-F238E27FC236}">
-                <a16:creationId xmlns:a16="http://schemas.microsoft.com/office/drawing/2014/main" id="{1698E368-7342-4D44-B884-4198490CF74A}"/>
+                <a16:creationId xmlns:a16="http://schemas.microsoft.com/office/drawing/2014/main" xmlns="" id="{1698E368-7342-4D44-B884-4198490CF74A}"/>
               </a:ext>
             </a:extLst>
           </p:cNvPr>
@@ -4672,7 +4675,7 @@
           <p:cNvPr id="5" name="Picture 2">
             <a:extLst>
               <a:ext uri="{FF2B5EF4-FFF2-40B4-BE49-F238E27FC236}">
-                <a16:creationId xmlns:a16="http://schemas.microsoft.com/office/drawing/2014/main" id="{AAB4E0FE-41AB-4198-A18E-42DED5A0627B}"/>
+                <a16:creationId xmlns:a16="http://schemas.microsoft.com/office/drawing/2014/main" xmlns="" id="{AAB4E0FE-41AB-4198-A18E-42DED5A0627B}"/>
               </a:ext>
             </a:extLst>
           </p:cNvPr>
@@ -4762,7 +4765,7 @@
           <p:cNvPr id="2" name="Marcador de número de diapositiva 1">
             <a:extLst>
               <a:ext uri="{FF2B5EF4-FFF2-40B4-BE49-F238E27FC236}">
-                <a16:creationId xmlns:a16="http://schemas.microsoft.com/office/drawing/2014/main" id="{33B8B368-D5C9-4B80-BE64-9EA0D553553E}"/>
+                <a16:creationId xmlns:a16="http://schemas.microsoft.com/office/drawing/2014/main" xmlns="" id="{33B8B368-D5C9-4B80-BE64-9EA0D553553E}"/>
               </a:ext>
             </a:extLst>
           </p:cNvPr>
@@ -4791,7 +4794,7 @@
           <p:cNvPr id="3" name="CuadroTexto 2">
             <a:extLst>
               <a:ext uri="{FF2B5EF4-FFF2-40B4-BE49-F238E27FC236}">
-                <a16:creationId xmlns:a16="http://schemas.microsoft.com/office/drawing/2014/main" id="{A91D9332-20CA-4C51-9C20-C1B439360171}"/>
+                <a16:creationId xmlns:a16="http://schemas.microsoft.com/office/drawing/2014/main" xmlns="" id="{A91D9332-20CA-4C51-9C20-C1B439360171}"/>
               </a:ext>
             </a:extLst>
           </p:cNvPr>
@@ -4930,7 +4933,7 @@
           <p:cNvPr id="4" name="Picture 2">
             <a:extLst>
               <a:ext uri="{FF2B5EF4-FFF2-40B4-BE49-F238E27FC236}">
-                <a16:creationId xmlns:a16="http://schemas.microsoft.com/office/drawing/2014/main" id="{516D38B9-5963-44AE-A11D-E67453BF94AF}"/>
+                <a16:creationId xmlns:a16="http://schemas.microsoft.com/office/drawing/2014/main" xmlns="" id="{516D38B9-5963-44AE-A11D-E67453BF94AF}"/>
               </a:ext>
             </a:extLst>
           </p:cNvPr>
@@ -5127,7 +5130,7 @@
           <p:cNvPr id="4" name="Picture 2">
             <a:extLst>
               <a:ext uri="{FF2B5EF4-FFF2-40B4-BE49-F238E27FC236}">
-                <a16:creationId xmlns:a16="http://schemas.microsoft.com/office/drawing/2014/main" id="{E65B1306-4575-4BFA-905C-C21EC2E89E9A}"/>
+                <a16:creationId xmlns:a16="http://schemas.microsoft.com/office/drawing/2014/main" xmlns="" id="{E65B1306-4575-4BFA-905C-C21EC2E89E9A}"/>
               </a:ext>
             </a:extLst>
           </p:cNvPr>
@@ -5285,7 +5288,27 @@
                   </a:schemeClr>
                 </a:solidFill>
               </a:rPr>
-              <a:t>Es un comando que copia un proyecto desde github a nuestra computadora.</a:t>
+              <a:t>Es un comando que copia un proyecto desde </a:t>
+            </a:r>
+            <a:r>
+              <a:rPr lang="es-AR" sz="2800" dirty="0" err="1">
+                <a:solidFill>
+                  <a:schemeClr val="tx1">
+                    <a:tint val="75000"/>
+                  </a:schemeClr>
+                </a:solidFill>
+              </a:rPr>
+              <a:t>github</a:t>
+            </a:r>
+            <a:r>
+              <a:rPr lang="es-AR" sz="2800" dirty="0">
+                <a:solidFill>
+                  <a:schemeClr val="tx1">
+                    <a:tint val="75000"/>
+                  </a:schemeClr>
+                </a:solidFill>
+              </a:rPr>
+              <a:t> a nuestra computadora.</a:t>
             </a:r>
             <a:endParaRPr lang="es-AR" dirty="0"/>
           </a:p>
@@ -5375,7 +5398,7 @@
           <p:cNvPr id="5" name="Picture 2">
             <a:extLst>
               <a:ext uri="{FF2B5EF4-FFF2-40B4-BE49-F238E27FC236}">
-                <a16:creationId xmlns:a16="http://schemas.microsoft.com/office/drawing/2014/main" id="{67F6A425-BFB3-4431-9FB6-BDAA4091AE1B}"/>
+                <a16:creationId xmlns:a16="http://schemas.microsoft.com/office/drawing/2014/main" xmlns="" id="{67F6A425-BFB3-4431-9FB6-BDAA4091AE1B}"/>
               </a:ext>
             </a:extLst>
           </p:cNvPr>
@@ -5542,7 +5565,7 @@
           <p:cNvPr id="4" name="Picture 2">
             <a:extLst>
               <a:ext uri="{FF2B5EF4-FFF2-40B4-BE49-F238E27FC236}">
-                <a16:creationId xmlns:a16="http://schemas.microsoft.com/office/drawing/2014/main" id="{2A87D634-C1D8-479E-9897-1482C3D1F9F2}"/>
+                <a16:creationId xmlns:a16="http://schemas.microsoft.com/office/drawing/2014/main" xmlns="" id="{2A87D634-C1D8-479E-9897-1482C3D1F9F2}"/>
               </a:ext>
             </a:extLst>
           </p:cNvPr>
@@ -5849,7 +5872,7 @@
           <p:cNvPr id="6" name="Picture 2">
             <a:extLst>
               <a:ext uri="{FF2B5EF4-FFF2-40B4-BE49-F238E27FC236}">
-                <a16:creationId xmlns:a16="http://schemas.microsoft.com/office/drawing/2014/main" id="{EC031312-1A4E-4560-BF53-4FF5D057B38A}"/>
+                <a16:creationId xmlns:a16="http://schemas.microsoft.com/office/drawing/2014/main" xmlns="" id="{EC031312-1A4E-4560-BF53-4FF5D057B38A}"/>
               </a:ext>
             </a:extLst>
           </p:cNvPr>
@@ -6164,7 +6187,7 @@
           <p:cNvPr id="6" name="Picture 2">
             <a:extLst>
               <a:ext uri="{FF2B5EF4-FFF2-40B4-BE49-F238E27FC236}">
-                <a16:creationId xmlns:a16="http://schemas.microsoft.com/office/drawing/2014/main" id="{DE9F6ADB-60E0-441E-8A2D-60D77EB5D563}"/>
+                <a16:creationId xmlns:a16="http://schemas.microsoft.com/office/drawing/2014/main" xmlns="" id="{DE9F6ADB-60E0-441E-8A2D-60D77EB5D563}"/>
               </a:ext>
             </a:extLst>
           </p:cNvPr>
@@ -6411,7 +6434,7 @@
           <p:cNvPr id="5" name="Picture 2">
             <a:extLst>
               <a:ext uri="{FF2B5EF4-FFF2-40B4-BE49-F238E27FC236}">
-                <a16:creationId xmlns:a16="http://schemas.microsoft.com/office/drawing/2014/main" id="{68E3B84D-0ABC-4B1E-A758-CC07D504988F}"/>
+                <a16:creationId xmlns:a16="http://schemas.microsoft.com/office/drawing/2014/main" xmlns="" id="{68E3B84D-0ABC-4B1E-A758-CC07D504988F}"/>
               </a:ext>
             </a:extLst>
           </p:cNvPr>
@@ -7136,7 +7159,7 @@
           <p:cNvPr id="6" name="Picture 2">
             <a:extLst>
               <a:ext uri="{FF2B5EF4-FFF2-40B4-BE49-F238E27FC236}">
-                <a16:creationId xmlns:a16="http://schemas.microsoft.com/office/drawing/2014/main" id="{F63DA546-2131-4244-AB4B-4CAF4FDDFD24}"/>
+                <a16:creationId xmlns:a16="http://schemas.microsoft.com/office/drawing/2014/main" xmlns="" id="{F63DA546-2131-4244-AB4B-4CAF4FDDFD24}"/>
               </a:ext>
             </a:extLst>
           </p:cNvPr>
@@ -7338,7 +7361,7 @@
           <p:cNvPr id="5" name="Picture 2">
             <a:extLst>
               <a:ext uri="{FF2B5EF4-FFF2-40B4-BE49-F238E27FC236}">
-                <a16:creationId xmlns:a16="http://schemas.microsoft.com/office/drawing/2014/main" id="{26166BD1-EBAC-4DC7-B19C-203B155FEEF2}"/>
+                <a16:creationId xmlns:a16="http://schemas.microsoft.com/office/drawing/2014/main" xmlns="" id="{26166BD1-EBAC-4DC7-B19C-203B155FEEF2}"/>
               </a:ext>
             </a:extLst>
           </p:cNvPr>
@@ -7599,7 +7622,7 @@
           <p:cNvPr id="6" name="Picture 2">
             <a:extLst>
               <a:ext uri="{FF2B5EF4-FFF2-40B4-BE49-F238E27FC236}">
-                <a16:creationId xmlns:a16="http://schemas.microsoft.com/office/drawing/2014/main" id="{E8E1E1C2-DCFC-4A9C-A816-8A9DBBC8338D}"/>
+                <a16:creationId xmlns:a16="http://schemas.microsoft.com/office/drawing/2014/main" xmlns="" id="{E8E1E1C2-DCFC-4A9C-A816-8A9DBBC8338D}"/>
               </a:ext>
             </a:extLst>
           </p:cNvPr>
@@ -7836,7 +7859,7 @@
           <p:cNvPr id="6" name="Picture 2">
             <a:extLst>
               <a:ext uri="{FF2B5EF4-FFF2-40B4-BE49-F238E27FC236}">
-                <a16:creationId xmlns:a16="http://schemas.microsoft.com/office/drawing/2014/main" id="{A2FDFC38-A636-41DD-BEE2-3D090B42C99D}"/>
+                <a16:creationId xmlns:a16="http://schemas.microsoft.com/office/drawing/2014/main" xmlns="" id="{A2FDFC38-A636-41DD-BEE2-3D090B42C99D}"/>
               </a:ext>
             </a:extLst>
           </p:cNvPr>
@@ -8026,7 +8049,7 @@
           <p:cNvPr id="4" name="Picture 2">
             <a:extLst>
               <a:ext uri="{FF2B5EF4-FFF2-40B4-BE49-F238E27FC236}">
-                <a16:creationId xmlns:a16="http://schemas.microsoft.com/office/drawing/2014/main" id="{F5E8A3EA-C619-46A2-BCC8-6B9D971814E4}"/>
+                <a16:creationId xmlns:a16="http://schemas.microsoft.com/office/drawing/2014/main" xmlns="" id="{F5E8A3EA-C619-46A2-BCC8-6B9D971814E4}"/>
               </a:ext>
             </a:extLst>
           </p:cNvPr>
@@ -8116,7 +8139,7 @@
           <p:cNvPr id="2" name="Marcador de número de diapositiva 1">
             <a:extLst>
               <a:ext uri="{FF2B5EF4-FFF2-40B4-BE49-F238E27FC236}">
-                <a16:creationId xmlns:a16="http://schemas.microsoft.com/office/drawing/2014/main" id="{1E07E2BA-037A-425F-A26C-216ACEC88BFD}"/>
+                <a16:creationId xmlns:a16="http://schemas.microsoft.com/office/drawing/2014/main" xmlns="" id="{1E07E2BA-037A-425F-A26C-216ACEC88BFD}"/>
               </a:ext>
             </a:extLst>
           </p:cNvPr>
@@ -8145,7 +8168,7 @@
           <p:cNvPr id="3" name="CuadroTexto 2">
             <a:extLst>
               <a:ext uri="{FF2B5EF4-FFF2-40B4-BE49-F238E27FC236}">
-                <a16:creationId xmlns:a16="http://schemas.microsoft.com/office/drawing/2014/main" id="{266D144E-1424-4F46-B82C-8D95CCDEF6A5}"/>
+                <a16:creationId xmlns:a16="http://schemas.microsoft.com/office/drawing/2014/main" xmlns="" id="{266D144E-1424-4F46-B82C-8D95CCDEF6A5}"/>
               </a:ext>
             </a:extLst>
           </p:cNvPr>
@@ -8230,29 +8253,7 @@
                   </a:schemeClr>
                 </a:solidFill>
               </a:rPr>
-              <a:t>$</a:t>
-            </a:r>
-            <a:r>
-              <a:rPr lang="es-AR" sz="2800" dirty="0" err="1">
-                <a:solidFill>
-                  <a:schemeClr val="tx1">
-                    <a:lumMod val="65000"/>
-                    <a:lumOff val="35000"/>
-                  </a:schemeClr>
-                </a:solidFill>
-              </a:rPr>
-              <a:t>git</a:t>
-            </a:r>
-            <a:r>
-              <a:rPr lang="es-AR" sz="2800" dirty="0">
-                <a:solidFill>
-                  <a:schemeClr val="tx1">
-                    <a:lumMod val="65000"/>
-                    <a:lumOff val="35000"/>
-                  </a:schemeClr>
-                </a:solidFill>
-              </a:rPr>
-              <a:t> tag –a v1.0 –m “Mensaje” “identificadorDelCommit”</a:t>
+              <a:t>$git tag –a v1.0 –m “Mensaje” “identificadorDelCommit”</a:t>
             </a:r>
           </a:p>
         </p:txBody>
@@ -8262,7 +8263,7 @@
           <p:cNvPr id="4" name="Imagen 3">
             <a:extLst>
               <a:ext uri="{FF2B5EF4-FFF2-40B4-BE49-F238E27FC236}">
-                <a16:creationId xmlns:a16="http://schemas.microsoft.com/office/drawing/2014/main" id="{8A734056-A732-40B1-8B66-D2B60EFEED64}"/>
+                <a16:creationId xmlns:a16="http://schemas.microsoft.com/office/drawing/2014/main" xmlns="" id="{8A734056-A732-40B1-8B66-D2B60EFEED64}"/>
               </a:ext>
             </a:extLst>
           </p:cNvPr>
@@ -8292,7 +8293,7 @@
           <p:cNvPr id="5" name="CuadroTexto 4">
             <a:extLst>
               <a:ext uri="{FF2B5EF4-FFF2-40B4-BE49-F238E27FC236}">
-                <a16:creationId xmlns:a16="http://schemas.microsoft.com/office/drawing/2014/main" id="{CFE91167-12CF-4215-8ADF-B73462F18EF4}"/>
+                <a16:creationId xmlns:a16="http://schemas.microsoft.com/office/drawing/2014/main" xmlns="" id="{CFE91167-12CF-4215-8ADF-B73462F18EF4}"/>
               </a:ext>
             </a:extLst>
           </p:cNvPr>
@@ -8339,10 +8340,25 @@
                   </a:schemeClr>
                 </a:solidFill>
               </a:rPr>
-              <a:t>$</a:t>
-            </a:r>
-            <a:r>
-              <a:rPr lang="es-AR" sz="2800" dirty="0" err="1">
+              <a:t>$git push origin numeroDeVersion  </a:t>
+            </a:r>
+            <a:r>
+              <a:rPr lang="es-AR" sz="2800" dirty="0">
+                <a:solidFill>
+                  <a:schemeClr val="tx1">
+                    <a:tint val="75000"/>
+                  </a:schemeClr>
+                </a:solidFill>
+              </a:rPr>
+              <a:t>Para subir un solo tag.</a:t>
+            </a:r>
+          </a:p>
+          <a:p>
+            <a:endParaRPr lang="es-AR" dirty="0"/>
+          </a:p>
+          <a:p>
+            <a:r>
+              <a:rPr lang="es-AR" sz="2800" dirty="0">
                 <a:solidFill>
                   <a:schemeClr val="tx1">
                     <a:lumMod val="65000"/>
@@ -8350,10 +8366,10 @@
                   </a:schemeClr>
                 </a:solidFill>
               </a:rPr>
-              <a:t>git</a:t>
-            </a:r>
-            <a:r>
-              <a:rPr lang="es-AR" sz="2800" dirty="0">
+              <a:t>$git push origin </a:t>
+            </a:r>
+            <a:r>
+              <a:rPr lang="es-AR" sz="2800" dirty="0" smtClean="0">
                 <a:solidFill>
                   <a:schemeClr val="tx1">
                     <a:lumMod val="65000"/>
@@ -8361,10 +8377,10 @@
                   </a:schemeClr>
                 </a:solidFill>
               </a:rPr>
-              <a:t> </a:t>
-            </a:r>
-            <a:r>
-              <a:rPr lang="es-AR" sz="2800" dirty="0" err="1">
+              <a:t>--</a:t>
+            </a:r>
+            <a:r>
+              <a:rPr lang="es-AR" sz="2800" dirty="0" err="1" smtClean="0">
                 <a:solidFill>
                   <a:schemeClr val="tx1">
                     <a:lumMod val="65000"/>
@@ -8372,10 +8388,10 @@
                   </a:schemeClr>
                 </a:solidFill>
               </a:rPr>
-              <a:t>push</a:t>
-            </a:r>
-            <a:r>
-              <a:rPr lang="es-AR" sz="2800" dirty="0">
+              <a:t>tags</a:t>
+            </a:r>
+            <a:r>
+              <a:rPr lang="es-AR" sz="2800" dirty="0" smtClean="0">
                 <a:solidFill>
                   <a:schemeClr val="tx1">
                     <a:lumMod val="65000"/>
@@ -8383,143 +8399,7 @@
                   </a:schemeClr>
                 </a:solidFill>
               </a:rPr>
-              <a:t> </a:t>
-            </a:r>
-            <a:r>
-              <a:rPr lang="es-AR" sz="2800" dirty="0" err="1">
-                <a:solidFill>
-                  <a:schemeClr val="tx1">
-                    <a:lumMod val="65000"/>
-                    <a:lumOff val="35000"/>
-                  </a:schemeClr>
-                </a:solidFill>
-              </a:rPr>
-              <a:t>origin</a:t>
-            </a:r>
-            <a:r>
-              <a:rPr lang="es-AR" sz="2800" dirty="0">
-                <a:solidFill>
-                  <a:schemeClr val="tx1">
-                    <a:lumMod val="65000"/>
-                    <a:lumOff val="35000"/>
-                  </a:schemeClr>
-                </a:solidFill>
-              </a:rPr>
-              <a:t> </a:t>
-            </a:r>
-            <a:r>
-              <a:rPr lang="es-AR" sz="2800" dirty="0" err="1">
-                <a:solidFill>
-                  <a:schemeClr val="tx1">
-                    <a:lumMod val="65000"/>
-                    <a:lumOff val="35000"/>
-                  </a:schemeClr>
-                </a:solidFill>
-              </a:rPr>
-              <a:t>numeroDeVersion</a:t>
-            </a:r>
-            <a:r>
-              <a:rPr lang="es-AR" sz="2800" dirty="0">
-                <a:solidFill>
-                  <a:schemeClr val="tx1">
-                    <a:lumMod val="65000"/>
-                    <a:lumOff val="35000"/>
-                  </a:schemeClr>
-                </a:solidFill>
-              </a:rPr>
-              <a:t>  </a:t>
-            </a:r>
-            <a:r>
-              <a:rPr lang="es-AR" sz="2800" dirty="0">
-                <a:solidFill>
-                  <a:schemeClr val="tx1">
-                    <a:tint val="75000"/>
-                  </a:schemeClr>
-                </a:solidFill>
-              </a:rPr>
-              <a:t>Para subir un solo tag.</a:t>
-            </a:r>
-          </a:p>
-          <a:p>
-            <a:endParaRPr lang="es-AR" dirty="0"/>
-          </a:p>
-          <a:p>
-            <a:r>
-              <a:rPr lang="es-AR" sz="2800" dirty="0">
-                <a:solidFill>
-                  <a:schemeClr val="tx1">
-                    <a:lumMod val="65000"/>
-                    <a:lumOff val="35000"/>
-                  </a:schemeClr>
-                </a:solidFill>
-              </a:rPr>
-              <a:t>$</a:t>
-            </a:r>
-            <a:r>
-              <a:rPr lang="es-AR" sz="2800" dirty="0" err="1">
-                <a:solidFill>
-                  <a:schemeClr val="tx1">
-                    <a:lumMod val="65000"/>
-                    <a:lumOff val="35000"/>
-                  </a:schemeClr>
-                </a:solidFill>
-              </a:rPr>
-              <a:t>git</a:t>
-            </a:r>
-            <a:r>
-              <a:rPr lang="es-AR" sz="2800" dirty="0">
-                <a:solidFill>
-                  <a:schemeClr val="tx1">
-                    <a:lumMod val="65000"/>
-                    <a:lumOff val="35000"/>
-                  </a:schemeClr>
-                </a:solidFill>
-              </a:rPr>
-              <a:t> </a:t>
-            </a:r>
-            <a:r>
-              <a:rPr lang="es-AR" sz="2800" dirty="0" err="1">
-                <a:solidFill>
-                  <a:schemeClr val="tx1">
-                    <a:lumMod val="65000"/>
-                    <a:lumOff val="35000"/>
-                  </a:schemeClr>
-                </a:solidFill>
-              </a:rPr>
-              <a:t>push</a:t>
-            </a:r>
-            <a:r>
-              <a:rPr lang="es-AR" sz="2800" dirty="0">
-                <a:solidFill>
-                  <a:schemeClr val="tx1">
-                    <a:lumMod val="65000"/>
-                    <a:lumOff val="35000"/>
-                  </a:schemeClr>
-                </a:solidFill>
-              </a:rPr>
-              <a:t> </a:t>
-            </a:r>
-            <a:r>
-              <a:rPr lang="es-AR" sz="2800" dirty="0" err="1">
-                <a:solidFill>
-                  <a:schemeClr val="tx1">
-                    <a:lumMod val="65000"/>
-                    <a:lumOff val="35000"/>
-                  </a:schemeClr>
-                </a:solidFill>
-              </a:rPr>
-              <a:t>origin</a:t>
-            </a:r>
-            <a:r>
-              <a:rPr lang="es-AR" sz="2800" dirty="0">
-                <a:solidFill>
-                  <a:schemeClr val="tx1">
-                    <a:lumMod val="65000"/>
-                    <a:lumOff val="35000"/>
-                  </a:schemeClr>
-                </a:solidFill>
-              </a:rPr>
-              <a:t> –tags   </a:t>
+              <a:t>   </a:t>
             </a:r>
             <a:r>
               <a:rPr lang="es-AR" sz="2800" dirty="0">
@@ -8545,6 +8425,485 @@
     <p:extLst>
       <p:ext uri="{BB962C8B-B14F-4D97-AF65-F5344CB8AC3E}">
         <p14:creationId xmlns:p14="http://schemas.microsoft.com/office/powerpoint/2010/main" val="563967554"/>
+      </p:ext>
+    </p:extLst>
+  </p:cSld>
+  <p:clrMapOvr>
+    <a:masterClrMapping/>
+  </p:clrMapOvr>
+</p:sld>
+</file>
+
+<file path=ppt/slides/slide26.xml><?xml version="1.0" encoding="utf-8"?>
+<p:sld xmlns:a="http://schemas.openxmlformats.org/drawingml/2006/main" xmlns:r="http://schemas.openxmlformats.org/officeDocument/2006/relationships" xmlns:p="http://schemas.openxmlformats.org/presentationml/2006/main">
+  <p:cSld>
+    <p:spTree>
+      <p:nvGrpSpPr>
+        <p:cNvPr id="1" name=""/>
+        <p:cNvGrpSpPr/>
+        <p:nvPr/>
+      </p:nvGrpSpPr>
+      <p:grpSpPr>
+        <a:xfrm>
+          <a:off x="0" y="0"/>
+          <a:ext cx="0" cy="0"/>
+          <a:chOff x="0" y="0"/>
+          <a:chExt cx="0" cy="0"/>
+        </a:xfrm>
+      </p:grpSpPr>
+      <p:sp>
+        <p:nvSpPr>
+          <p:cNvPr id="2" name="1 Marcador de número de diapositiva"/>
+          <p:cNvSpPr>
+            <a:spLocks noGrp="1"/>
+          </p:cNvSpPr>
+          <p:nvPr>
+            <p:ph type="sldNum" sz="quarter" idx="12"/>
+          </p:nvPr>
+        </p:nvSpPr>
+        <p:spPr/>
+        <p:txBody>
+          <a:bodyPr/>
+          <a:lstStyle/>
+          <a:p>
+            <a:fld id="{0BC4794F-2822-4E64-BD4E-610CFED61AD4}" type="slidenum">
+              <a:rPr lang="es-AR" smtClean="0"/>
+              <a:t>26</a:t>
+            </a:fld>
+            <a:endParaRPr lang="es-AR"/>
+          </a:p>
+        </p:txBody>
+      </p:sp>
+      <p:sp>
+        <p:nvSpPr>
+          <p:cNvPr id="3" name="2 CuadroTexto"/>
+          <p:cNvSpPr txBox="1"/>
+          <p:nvPr/>
+        </p:nvSpPr>
+        <p:spPr>
+          <a:xfrm>
+            <a:off x="179512" y="301824"/>
+            <a:ext cx="8856984" cy="4431983"/>
+          </a:xfrm>
+          <a:prstGeom prst="rect">
+            <a:avLst/>
+          </a:prstGeom>
+          <a:noFill/>
+        </p:spPr>
+        <p:txBody>
+          <a:bodyPr wrap="square" rtlCol="0">
+            <a:spAutoFit/>
+          </a:bodyPr>
+          <a:lstStyle/>
+          <a:p>
+            <a:pPr algn="ctr"/>
+            <a:r>
+              <a:rPr lang="es-AR" sz="4000" u="sng" dirty="0">
+                <a:solidFill>
+                  <a:schemeClr val="tx1">
+                    <a:lumMod val="65000"/>
+                    <a:lumOff val="35000"/>
+                  </a:schemeClr>
+                </a:solidFill>
+                <a:latin typeface="+mj-lt"/>
+                <a:ea typeface="+mj-ea"/>
+                <a:cs typeface="+mj-cs"/>
+              </a:rPr>
+              <a:t>Workflows (Flujos de Trabajo)</a:t>
+            </a:r>
+          </a:p>
+          <a:p>
+            <a:endParaRPr lang="es-AR" dirty="0" smtClean="0"/>
+          </a:p>
+          <a:p>
+            <a:pPr marL="514350" indent="-514350">
+              <a:buFont typeface="+mj-lt"/>
+              <a:buAutoNum type="arabicPeriod"/>
+            </a:pPr>
+            <a:r>
+              <a:rPr lang="es-AR" sz="2800" dirty="0">
+                <a:solidFill>
+                  <a:schemeClr val="tx1">
+                    <a:tint val="75000"/>
+                  </a:schemeClr>
+                </a:solidFill>
+              </a:rPr>
+              <a:t>Proyectos Propios</a:t>
+            </a:r>
+          </a:p>
+          <a:p>
+            <a:pPr marL="514350" indent="-514350">
+              <a:buFont typeface="+mj-lt"/>
+              <a:buAutoNum type="arabicPeriod"/>
+            </a:pPr>
+            <a:r>
+              <a:rPr lang="es-AR" sz="2800" dirty="0">
+                <a:solidFill>
+                  <a:schemeClr val="tx1">
+                    <a:tint val="75000"/>
+                  </a:schemeClr>
+                </a:solidFill>
+              </a:rPr>
+              <a:t>Proyectos en equipo</a:t>
+            </a:r>
+          </a:p>
+          <a:p>
+            <a:pPr marL="514350" indent="-514350">
+              <a:buFont typeface="+mj-lt"/>
+              <a:buAutoNum type="arabicPeriod"/>
+            </a:pPr>
+            <a:r>
+              <a:rPr lang="es-AR" sz="2800" dirty="0">
+                <a:solidFill>
+                  <a:schemeClr val="tx1">
+                    <a:tint val="75000"/>
+                  </a:schemeClr>
+                </a:solidFill>
+              </a:rPr>
+              <a:t>Proyectos con </a:t>
+            </a:r>
+            <a:r>
+              <a:rPr lang="es-AR" sz="2800" dirty="0" smtClean="0">
+                <a:solidFill>
+                  <a:schemeClr val="tx1">
+                    <a:tint val="75000"/>
+                  </a:schemeClr>
+                </a:solidFill>
+              </a:rPr>
+              <a:t>terceros</a:t>
+            </a:r>
+          </a:p>
+          <a:p>
+            <a:endParaRPr lang="es-AR" sz="2800" dirty="0">
+              <a:solidFill>
+                <a:schemeClr val="tx1">
+                  <a:tint val="75000"/>
+                </a:schemeClr>
+              </a:solidFill>
+            </a:endParaRPr>
+          </a:p>
+          <a:p>
+            <a:r>
+              <a:rPr lang="es-AR" sz="2800" dirty="0" smtClean="0">
+                <a:solidFill>
+                  <a:schemeClr val="tx1">
+                    <a:tint val="75000"/>
+                  </a:schemeClr>
+                </a:solidFill>
+              </a:rPr>
+              <a:t>Proyectos propios es lo que ya vimos. Es lo menos usado, se usa en este caso por una cuestión de seguridad y de tenerlo disponible en cualquier momento. </a:t>
+            </a:r>
+          </a:p>
+          <a:p>
+            <a:endParaRPr lang="es-AR" sz="2800" dirty="0">
+              <a:solidFill>
+                <a:schemeClr val="tx1">
+                  <a:tint val="75000"/>
+                </a:schemeClr>
+              </a:solidFill>
+            </a:endParaRPr>
+          </a:p>
+        </p:txBody>
+      </p:sp>
+    </p:spTree>
+    <p:extLst>
+      <p:ext uri="{BB962C8B-B14F-4D97-AF65-F5344CB8AC3E}">
+        <p14:creationId xmlns:p14="http://schemas.microsoft.com/office/powerpoint/2010/main" val="2928291267"/>
+      </p:ext>
+    </p:extLst>
+  </p:cSld>
+  <p:clrMapOvr>
+    <a:masterClrMapping/>
+  </p:clrMapOvr>
+</p:sld>
+</file>
+
+<file path=ppt/slides/slide27.xml><?xml version="1.0" encoding="utf-8"?>
+<p:sld xmlns:a="http://schemas.openxmlformats.org/drawingml/2006/main" xmlns:r="http://schemas.openxmlformats.org/officeDocument/2006/relationships" xmlns:p="http://schemas.openxmlformats.org/presentationml/2006/main">
+  <p:cSld>
+    <p:spTree>
+      <p:nvGrpSpPr>
+        <p:cNvPr id="1" name=""/>
+        <p:cNvGrpSpPr/>
+        <p:nvPr/>
+      </p:nvGrpSpPr>
+      <p:grpSpPr>
+        <a:xfrm>
+          <a:off x="0" y="0"/>
+          <a:ext cx="0" cy="0"/>
+          <a:chOff x="0" y="0"/>
+          <a:chExt cx="0" cy="0"/>
+        </a:xfrm>
+      </p:grpSpPr>
+      <p:sp>
+        <p:nvSpPr>
+          <p:cNvPr id="2" name="1 Marcador de número de diapositiva"/>
+          <p:cNvSpPr>
+            <a:spLocks noGrp="1"/>
+          </p:cNvSpPr>
+          <p:nvPr>
+            <p:ph type="sldNum" sz="quarter" idx="12"/>
+          </p:nvPr>
+        </p:nvSpPr>
+        <p:spPr/>
+        <p:txBody>
+          <a:bodyPr/>
+          <a:lstStyle/>
+          <a:p>
+            <a:fld id="{0BC4794F-2822-4E64-BD4E-610CFED61AD4}" type="slidenum">
+              <a:rPr lang="es-AR" smtClean="0"/>
+              <a:t>27</a:t>
+            </a:fld>
+            <a:endParaRPr lang="es-AR"/>
+          </a:p>
+        </p:txBody>
+      </p:sp>
+      <p:sp>
+        <p:nvSpPr>
+          <p:cNvPr id="3" name="2 Rectángulo"/>
+          <p:cNvSpPr/>
+          <p:nvPr/>
+        </p:nvSpPr>
+        <p:spPr>
+          <a:xfrm>
+            <a:off x="323528" y="260648"/>
+            <a:ext cx="8640960" cy="1846659"/>
+          </a:xfrm>
+          <a:prstGeom prst="rect">
+            <a:avLst/>
+          </a:prstGeom>
+        </p:spPr>
+        <p:txBody>
+          <a:bodyPr wrap="square">
+            <a:spAutoFit/>
+          </a:bodyPr>
+          <a:lstStyle/>
+          <a:p>
+            <a:pPr algn="ctr"/>
+            <a:r>
+              <a:rPr lang="es-AR" sz="4000" u="sng" dirty="0">
+                <a:solidFill>
+                  <a:schemeClr val="tx1">
+                    <a:lumMod val="65000"/>
+                    <a:lumOff val="35000"/>
+                  </a:schemeClr>
+                </a:solidFill>
+                <a:latin typeface="+mj-lt"/>
+                <a:ea typeface="+mj-ea"/>
+                <a:cs typeface="+mj-cs"/>
+              </a:rPr>
+              <a:t>Proyectos en Equipo</a:t>
+            </a:r>
+          </a:p>
+          <a:p>
+            <a:pPr algn="ctr"/>
+            <a:endParaRPr lang="es-AR" dirty="0">
+              <a:solidFill>
+                <a:schemeClr val="tx1">
+                  <a:tint val="75000"/>
+                </a:schemeClr>
+              </a:solidFill>
+            </a:endParaRPr>
+          </a:p>
+          <a:p>
+            <a:r>
+              <a:rPr lang="es-AR" sz="2800" dirty="0">
+                <a:solidFill>
+                  <a:schemeClr val="tx1">
+                    <a:tint val="75000"/>
+                  </a:schemeClr>
+                </a:solidFill>
+              </a:rPr>
+              <a:t>Para trabajar en </a:t>
+            </a:r>
+            <a:r>
+              <a:rPr lang="es-AR" sz="2800" dirty="0">
+                <a:solidFill>
+                  <a:schemeClr val="tx1">
+                    <a:tint val="75000"/>
+                  </a:schemeClr>
+                </a:solidFill>
+              </a:rPr>
+              <a:t>equipo hay que crear una organización de la página de Github</a:t>
+            </a:r>
+            <a:r>
+              <a:rPr lang="es-AR" dirty="0" smtClean="0">
+                <a:solidFill>
+                  <a:schemeClr val="tx1">
+                    <a:tint val="75000"/>
+                  </a:schemeClr>
+                </a:solidFill>
+              </a:rPr>
+              <a:t>.</a:t>
+            </a:r>
+            <a:endParaRPr lang="es-AR" dirty="0">
+              <a:solidFill>
+                <a:schemeClr val="tx1">
+                  <a:tint val="75000"/>
+                </a:schemeClr>
+              </a:solidFill>
+            </a:endParaRPr>
+          </a:p>
+        </p:txBody>
+      </p:sp>
+      <p:pic>
+        <p:nvPicPr>
+          <p:cNvPr id="1026" name="Picture 2"/>
+          <p:cNvPicPr>
+            <a:picLocks noChangeAspect="1" noChangeArrowheads="1"/>
+          </p:cNvPicPr>
+          <p:nvPr/>
+        </p:nvPicPr>
+        <p:blipFill>
+          <a:blip r:embed="rId2">
+            <a:extLst>
+              <a:ext uri="{28A0092B-C50C-407E-A947-70E740481C1C}">
+                <a14:useLocalDpi xmlns:a14="http://schemas.microsoft.com/office/drawing/2010/main" val="0"/>
+              </a:ext>
+            </a:extLst>
+          </a:blip>
+          <a:srcRect/>
+          <a:stretch>
+            <a:fillRect/>
+          </a:stretch>
+        </p:blipFill>
+        <p:spPr bwMode="auto">
+          <a:xfrm>
+            <a:off x="2699792" y="2159831"/>
+            <a:ext cx="2895600" cy="2088232"/>
+          </a:xfrm>
+          <a:prstGeom prst="rect">
+            <a:avLst/>
+          </a:prstGeom>
+          <a:noFill/>
+          <a:ln>
+            <a:noFill/>
+          </a:ln>
+          <a:extLst>
+            <a:ext uri="{909E8E84-426E-40DD-AFC4-6F175D3DCCD1}">
+              <a14:hiddenFill xmlns:a14="http://schemas.microsoft.com/office/drawing/2010/main">
+                <a:solidFill>
+                  <a:schemeClr val="accent1"/>
+                </a:solidFill>
+              </a14:hiddenFill>
+            </a:ext>
+            <a:ext uri="{91240B29-F687-4F45-9708-019B960494DF}">
+              <a14:hiddenLine xmlns:a14="http://schemas.microsoft.com/office/drawing/2010/main" w="9525">
+                <a:solidFill>
+                  <a:schemeClr val="tx1"/>
+                </a:solidFill>
+                <a:miter lim="800000"/>
+                <a:headEnd/>
+                <a:tailEnd/>
+              </a14:hiddenLine>
+            </a:ext>
+          </a:extLst>
+        </p:spPr>
+      </p:pic>
+      <p:sp>
+        <p:nvSpPr>
+          <p:cNvPr id="4" name="3 CuadroTexto"/>
+          <p:cNvSpPr txBox="1"/>
+          <p:nvPr/>
+        </p:nvSpPr>
+        <p:spPr>
+          <a:xfrm flipH="1">
+            <a:off x="278752" y="4437112"/>
+            <a:ext cx="8640961" cy="2246769"/>
+          </a:xfrm>
+          <a:prstGeom prst="rect">
+            <a:avLst/>
+          </a:prstGeom>
+          <a:noFill/>
+        </p:spPr>
+        <p:txBody>
+          <a:bodyPr wrap="square" rtlCol="0">
+            <a:spAutoFit/>
+          </a:bodyPr>
+          <a:lstStyle/>
+          <a:p>
+            <a:r>
+              <a:rPr lang="es-AR" sz="2800" dirty="0">
+                <a:solidFill>
+                  <a:schemeClr val="tx1">
+                    <a:tint val="75000"/>
+                  </a:schemeClr>
+                </a:solidFill>
+              </a:rPr>
+              <a:t>Primero se le asigna un nombre a la organización, se provee un mail para las notificaciones y luego se agregan los integrantes.</a:t>
+            </a:r>
+          </a:p>
+          <a:p>
+            <a:r>
+              <a:rPr lang="es-AR" sz="2800" dirty="0">
+                <a:solidFill>
+                  <a:schemeClr val="tx1">
+                    <a:tint val="75000"/>
+                  </a:schemeClr>
+                </a:solidFill>
+              </a:rPr>
+              <a:t>A los invitados le llega un mail con un link para aceptar participar del proyecto.</a:t>
+            </a:r>
+          </a:p>
+        </p:txBody>
+      </p:sp>
+    </p:spTree>
+    <p:extLst>
+      <p:ext uri="{BB962C8B-B14F-4D97-AF65-F5344CB8AC3E}">
+        <p14:creationId xmlns:p14="http://schemas.microsoft.com/office/powerpoint/2010/main" val="41904324"/>
+      </p:ext>
+    </p:extLst>
+  </p:cSld>
+  <p:clrMapOvr>
+    <a:masterClrMapping/>
+  </p:clrMapOvr>
+</p:sld>
+</file>
+
+<file path=ppt/slides/slide28.xml><?xml version="1.0" encoding="utf-8"?>
+<p:sld xmlns:a="http://schemas.openxmlformats.org/drawingml/2006/main" xmlns:r="http://schemas.openxmlformats.org/officeDocument/2006/relationships" xmlns:p="http://schemas.openxmlformats.org/presentationml/2006/main">
+  <p:cSld>
+    <p:spTree>
+      <p:nvGrpSpPr>
+        <p:cNvPr id="1" name=""/>
+        <p:cNvGrpSpPr/>
+        <p:nvPr/>
+      </p:nvGrpSpPr>
+      <p:grpSpPr>
+        <a:xfrm>
+          <a:off x="0" y="0"/>
+          <a:ext cx="0" cy="0"/>
+          <a:chOff x="0" y="0"/>
+          <a:chExt cx="0" cy="0"/>
+        </a:xfrm>
+      </p:grpSpPr>
+      <p:sp>
+        <p:nvSpPr>
+          <p:cNvPr id="2" name="1 Marcador de número de diapositiva"/>
+          <p:cNvSpPr>
+            <a:spLocks noGrp="1"/>
+          </p:cNvSpPr>
+          <p:nvPr>
+            <p:ph type="sldNum" sz="quarter" idx="12"/>
+          </p:nvPr>
+        </p:nvSpPr>
+        <p:spPr/>
+        <p:txBody>
+          <a:bodyPr/>
+          <a:lstStyle/>
+          <a:p>
+            <a:fld id="{0BC4794F-2822-4E64-BD4E-610CFED61AD4}" type="slidenum">
+              <a:rPr lang="es-AR" smtClean="0"/>
+              <a:t>28</a:t>
+            </a:fld>
+            <a:endParaRPr lang="es-AR"/>
+          </a:p>
+        </p:txBody>
+      </p:sp>
+    </p:spTree>
+    <p:extLst>
+      <p:ext uri="{BB962C8B-B14F-4D97-AF65-F5344CB8AC3E}">
+        <p14:creationId xmlns:p14="http://schemas.microsoft.com/office/powerpoint/2010/main" val="542386899"/>
       </p:ext>
     </p:extLst>
   </p:cSld>
@@ -9219,7 +9578,7 @@
           <p:cNvPr id="7" name="Picture 2">
             <a:extLst>
               <a:ext uri="{FF2B5EF4-FFF2-40B4-BE49-F238E27FC236}">
-                <a16:creationId xmlns:a16="http://schemas.microsoft.com/office/drawing/2014/main" id="{C8AFDC53-9CA0-4F27-AC02-CEC301CE3BCE}"/>
+                <a16:creationId xmlns:a16="http://schemas.microsoft.com/office/drawing/2014/main" xmlns="" id="{C8AFDC53-9CA0-4F27-AC02-CEC301CE3BCE}"/>
               </a:ext>
             </a:extLst>
           </p:cNvPr>
@@ -9514,7 +9873,7 @@
           <p:cNvPr id="5" name="Picture 2">
             <a:extLst>
               <a:ext uri="{FF2B5EF4-FFF2-40B4-BE49-F238E27FC236}">
-                <a16:creationId xmlns:a16="http://schemas.microsoft.com/office/drawing/2014/main" id="{39115142-9190-46B2-A8FC-8D135EBA8AAE}"/>
+                <a16:creationId xmlns:a16="http://schemas.microsoft.com/office/drawing/2014/main" xmlns="" id="{39115142-9190-46B2-A8FC-8D135EBA8AAE}"/>
               </a:ext>
             </a:extLst>
           </p:cNvPr>
@@ -9681,7 +10040,7 @@
           <p:cNvPr id="5" name="Picture 2">
             <a:extLst>
               <a:ext uri="{FF2B5EF4-FFF2-40B4-BE49-F238E27FC236}">
-                <a16:creationId xmlns:a16="http://schemas.microsoft.com/office/drawing/2014/main" id="{30AADA09-43A9-40AC-B7B7-B73F81F2F665}"/>
+                <a16:creationId xmlns:a16="http://schemas.microsoft.com/office/drawing/2014/main" xmlns="" id="{30AADA09-43A9-40AC-B7B7-B73F81F2F665}"/>
               </a:ext>
             </a:extLst>
           </p:cNvPr>
@@ -10277,7 +10636,7 @@
           <p:cNvPr id="6" name="Picture 2">
             <a:extLst>
               <a:ext uri="{FF2B5EF4-FFF2-40B4-BE49-F238E27FC236}">
-                <a16:creationId xmlns:a16="http://schemas.microsoft.com/office/drawing/2014/main" id="{BB42B011-4891-4CEB-BAC4-F8D4F4D7147A}"/>
+                <a16:creationId xmlns:a16="http://schemas.microsoft.com/office/drawing/2014/main" xmlns="" id="{BB42B011-4891-4CEB-BAC4-F8D4F4D7147A}"/>
               </a:ext>
             </a:extLst>
           </p:cNvPr>

</xml_diff>